<commit_message>
Changement de em en rem
</commit_message>
<xml_diff>
--- a/web design.pptx
+++ b/web design.pptx
@@ -261,7 +261,7 @@
           <a:p>
             <a:fld id="{767FAD24-E2EA-4E28-A795-C73D898D3785}" type="datetimeFigureOut">
               <a:rPr lang="fr-FR" smtClean="0"/>
-              <a:t>17/03/2021</a:t>
+              <a:t>23/03/2021</a:t>
             </a:fld>
             <a:endParaRPr lang="fr-FR"/>
           </a:p>
@@ -459,7 +459,7 @@
           <a:p>
             <a:fld id="{767FAD24-E2EA-4E28-A795-C73D898D3785}" type="datetimeFigureOut">
               <a:rPr lang="fr-FR" smtClean="0"/>
-              <a:t>17/03/2021</a:t>
+              <a:t>23/03/2021</a:t>
             </a:fld>
             <a:endParaRPr lang="fr-FR"/>
           </a:p>
@@ -667,7 +667,7 @@
           <a:p>
             <a:fld id="{767FAD24-E2EA-4E28-A795-C73D898D3785}" type="datetimeFigureOut">
               <a:rPr lang="fr-FR" smtClean="0"/>
-              <a:t>17/03/2021</a:t>
+              <a:t>23/03/2021</a:t>
             </a:fld>
             <a:endParaRPr lang="fr-FR"/>
           </a:p>
@@ -865,7 +865,7 @@
           <a:p>
             <a:fld id="{767FAD24-E2EA-4E28-A795-C73D898D3785}" type="datetimeFigureOut">
               <a:rPr lang="fr-FR" smtClean="0"/>
-              <a:t>17/03/2021</a:t>
+              <a:t>23/03/2021</a:t>
             </a:fld>
             <a:endParaRPr lang="fr-FR"/>
           </a:p>
@@ -1140,7 +1140,7 @@
           <a:p>
             <a:fld id="{767FAD24-E2EA-4E28-A795-C73D898D3785}" type="datetimeFigureOut">
               <a:rPr lang="fr-FR" smtClean="0"/>
-              <a:t>17/03/2021</a:t>
+              <a:t>23/03/2021</a:t>
             </a:fld>
             <a:endParaRPr lang="fr-FR"/>
           </a:p>
@@ -1405,7 +1405,7 @@
           <a:p>
             <a:fld id="{767FAD24-E2EA-4E28-A795-C73D898D3785}" type="datetimeFigureOut">
               <a:rPr lang="fr-FR" smtClean="0"/>
-              <a:t>17/03/2021</a:t>
+              <a:t>23/03/2021</a:t>
             </a:fld>
             <a:endParaRPr lang="fr-FR"/>
           </a:p>
@@ -1817,7 +1817,7 @@
           <a:p>
             <a:fld id="{767FAD24-E2EA-4E28-A795-C73D898D3785}" type="datetimeFigureOut">
               <a:rPr lang="fr-FR" smtClean="0"/>
-              <a:t>17/03/2021</a:t>
+              <a:t>23/03/2021</a:t>
             </a:fld>
             <a:endParaRPr lang="fr-FR"/>
           </a:p>
@@ -1958,7 +1958,7 @@
           <a:p>
             <a:fld id="{767FAD24-E2EA-4E28-A795-C73D898D3785}" type="datetimeFigureOut">
               <a:rPr lang="fr-FR" smtClean="0"/>
-              <a:t>17/03/2021</a:t>
+              <a:t>23/03/2021</a:t>
             </a:fld>
             <a:endParaRPr lang="fr-FR"/>
           </a:p>
@@ -2071,7 +2071,7 @@
           <a:p>
             <a:fld id="{767FAD24-E2EA-4E28-A795-C73D898D3785}" type="datetimeFigureOut">
               <a:rPr lang="fr-FR" smtClean="0"/>
-              <a:t>17/03/2021</a:t>
+              <a:t>23/03/2021</a:t>
             </a:fld>
             <a:endParaRPr lang="fr-FR"/>
           </a:p>
@@ -2382,7 +2382,7 @@
           <a:p>
             <a:fld id="{767FAD24-E2EA-4E28-A795-C73D898D3785}" type="datetimeFigureOut">
               <a:rPr lang="fr-FR" smtClean="0"/>
-              <a:t>17/03/2021</a:t>
+              <a:t>23/03/2021</a:t>
             </a:fld>
             <a:endParaRPr lang="fr-FR"/>
           </a:p>
@@ -2670,7 +2670,7 @@
           <a:p>
             <a:fld id="{767FAD24-E2EA-4E28-A795-C73D898D3785}" type="datetimeFigureOut">
               <a:rPr lang="fr-FR" smtClean="0"/>
-              <a:t>17/03/2021</a:t>
+              <a:t>23/03/2021</a:t>
             </a:fld>
             <a:endParaRPr lang="fr-FR"/>
           </a:p>
@@ -2911,7 +2911,7 @@
           <a:p>
             <a:fld id="{767FAD24-E2EA-4E28-A795-C73D898D3785}" type="datetimeFigureOut">
               <a:rPr lang="fr-FR" smtClean="0"/>
-              <a:t>17/03/2021</a:t>
+              <a:t>23/03/2021</a:t>
             </a:fld>
             <a:endParaRPr lang="fr-FR"/>
           </a:p>
@@ -4113,8 +4113,8 @@
         </p:nvSpPr>
         <p:spPr>
           <a:xfrm>
-            <a:off x="3656427" y="1536596"/>
-            <a:ext cx="4879144" cy="4415629"/>
+            <a:off x="1462024" y="1741537"/>
+            <a:ext cx="1770725" cy="1790557"/>
           </a:xfrm>
           <a:prstGeom prst="rect">
             <a:avLst/>
@@ -4145,14 +4145,22 @@
           </a:fontRef>
         </p:style>
         <p:txBody>
-          <a:bodyPr rtlCol="0" anchor="ctr"/>
+          <a:bodyPr rtlCol="0" anchor="t"/>
           <a:lstStyle/>
           <a:p>
             <a:pPr algn="ctr"/>
-            <a:endParaRPr lang="fr-FR" dirty="0">
-              <a:latin typeface="Arial" panose="020B0604020202020204" pitchFamily="34" charset="0"/>
-              <a:cs typeface="Arial" panose="020B0604020202020204" pitchFamily="34" charset="0"/>
-            </a:endParaRPr>
+            <a:r>
+              <a:rPr lang="fr-FR" sz="1000" dirty="0">
+                <a:solidFill>
+                  <a:schemeClr val="accent2">
+                    <a:lumMod val="50000"/>
+                  </a:schemeClr>
+                </a:solidFill>
+                <a:latin typeface="Arial" panose="020B0604020202020204" pitchFamily="34" charset="0"/>
+                <a:cs typeface="Arial" panose="020B0604020202020204" pitchFamily="34" charset="0"/>
+              </a:rPr>
+              <a:t>section</a:t>
+            </a:r>
           </a:p>
         </p:txBody>
       </p:sp>
@@ -4789,7 +4797,7 @@
         <p:spPr>
           <a:xfrm>
             <a:off x="1425849" y="282619"/>
-            <a:ext cx="1846052" cy="6484048"/>
+            <a:ext cx="1846052" cy="4258005"/>
           </a:xfrm>
           <a:prstGeom prst="rect">
             <a:avLst/>
@@ -4969,6 +4977,16 @@
             </a:lvl9pPr>
           </a:lstStyle>
           <a:p>
+            <a:r>
+              <a:rPr lang="fr-FR" sz="900" dirty="0">
+                <a:solidFill>
+                  <a:srgbClr val="FF0000"/>
+                </a:solidFill>
+                <a:latin typeface="Arial" panose="020B0604020202020204" pitchFamily="34" charset="0"/>
+                <a:cs typeface="Arial" panose="020B0604020202020204" pitchFamily="34" charset="0"/>
+              </a:rPr>
+              <a:t>body / </a:t>
+            </a:r>
             <a:r>
               <a:rPr lang="fr-FR" sz="900" dirty="0" err="1">
                 <a:solidFill>
@@ -5060,8 +5078,8 @@
         </p:nvSpPr>
         <p:spPr>
           <a:xfrm>
-            <a:off x="1446746" y="503966"/>
-            <a:ext cx="1783570" cy="807999"/>
+            <a:off x="1462024" y="503966"/>
+            <a:ext cx="1770726" cy="782469"/>
           </a:xfrm>
           <a:prstGeom prst="rect">
             <a:avLst/>
@@ -5244,6 +5262,18 @@
           </a:lstStyle>
           <a:p>
             <a:r>
+              <a:rPr lang="fr-FR" sz="900" dirty="0">
+                <a:solidFill>
+                  <a:schemeClr val="accent5">
+                    <a:lumMod val="50000"/>
+                  </a:schemeClr>
+                </a:solidFill>
+                <a:latin typeface="Arial" panose="020B0604020202020204" pitchFamily="34" charset="0"/>
+                <a:cs typeface="Arial" panose="020B0604020202020204" pitchFamily="34" charset="0"/>
+              </a:rPr>
+              <a:t>Header / </a:t>
+            </a:r>
+            <a:r>
               <a:rPr lang="fr-FR" sz="900" dirty="0" err="1">
                 <a:solidFill>
                   <a:schemeClr val="accent5">
@@ -5281,8 +5311,8 @@
         </p:nvSpPr>
         <p:spPr>
           <a:xfrm>
-            <a:off x="1438507" y="712295"/>
-            <a:ext cx="1791810" cy="257861"/>
+            <a:off x="1501588" y="712295"/>
+            <a:ext cx="1689848" cy="257861"/>
           </a:xfrm>
           <a:prstGeom prst="rect">
             <a:avLst/>
@@ -5342,8 +5372,8 @@
         </p:nvSpPr>
         <p:spPr>
           <a:xfrm>
-            <a:off x="1441486" y="993821"/>
-            <a:ext cx="1783570" cy="257861"/>
+            <a:off x="1496326" y="993821"/>
+            <a:ext cx="1689848" cy="257861"/>
           </a:xfrm>
           <a:prstGeom prst="rect">
             <a:avLst/>
@@ -5409,7 +5439,7 @@
         </p:nvSpPr>
         <p:spPr>
           <a:xfrm>
-            <a:off x="1464729" y="1346379"/>
+            <a:off x="1464729" y="1365833"/>
             <a:ext cx="1768292" cy="257861"/>
           </a:xfrm>
           <a:prstGeom prst="rect">
@@ -5456,6 +5486,504 @@
                 <a:cs typeface="Arial" panose="020B0604020202020204" pitchFamily="34" charset="0"/>
               </a:rPr>
               <a:t>recherche</a:t>
+            </a:r>
+          </a:p>
+        </p:txBody>
+      </p:sp>
+      <p:sp>
+        <p:nvSpPr>
+          <p:cNvPr id="33" name="Rectangle 32">
+            <a:extLst>
+              <a:ext uri="{FF2B5EF4-FFF2-40B4-BE49-F238E27FC236}">
+                <a16:creationId xmlns:a16="http://schemas.microsoft.com/office/drawing/2014/main" id="{2312870A-0C7E-4D70-90E5-A6400273C97C}"/>
+              </a:ext>
+            </a:extLst>
+          </p:cNvPr>
+          <p:cNvSpPr/>
+          <p:nvPr/>
+        </p:nvSpPr>
+        <p:spPr>
+          <a:xfrm>
+            <a:off x="3653994" y="1544710"/>
+            <a:ext cx="4879144" cy="4415629"/>
+          </a:xfrm>
+          <a:prstGeom prst="rect">
+            <a:avLst/>
+          </a:prstGeom>
+          <a:noFill/>
+          <a:ln w="38100">
+            <a:solidFill>
+              <a:schemeClr val="accent2">
+                <a:lumMod val="50000"/>
+              </a:schemeClr>
+            </a:solidFill>
+          </a:ln>
+        </p:spPr>
+        <p:style>
+          <a:lnRef idx="2">
+            <a:schemeClr val="accent1">
+              <a:shade val="50000"/>
+            </a:schemeClr>
+          </a:lnRef>
+          <a:fillRef idx="1">
+            <a:schemeClr val="accent1"/>
+          </a:fillRef>
+          <a:effectRef idx="0">
+            <a:schemeClr val="accent1"/>
+          </a:effectRef>
+          <a:fontRef idx="minor">
+            <a:schemeClr val="lt1"/>
+          </a:fontRef>
+        </p:style>
+        <p:txBody>
+          <a:bodyPr rtlCol="0" anchor="ctr"/>
+          <a:lstStyle/>
+          <a:p>
+            <a:pPr algn="ctr"/>
+            <a:endParaRPr lang="fr-FR" dirty="0">
+              <a:latin typeface="Arial" panose="020B0604020202020204" pitchFamily="34" charset="0"/>
+              <a:cs typeface="Arial" panose="020B0604020202020204" pitchFamily="34" charset="0"/>
+            </a:endParaRPr>
+          </a:p>
+        </p:txBody>
+      </p:sp>
+      <p:sp>
+        <p:nvSpPr>
+          <p:cNvPr id="35" name="Rectangle 34">
+            <a:extLst>
+              <a:ext uri="{FF2B5EF4-FFF2-40B4-BE49-F238E27FC236}">
+                <a16:creationId xmlns:a16="http://schemas.microsoft.com/office/drawing/2014/main" id="{04B6066F-0266-4BCD-B008-311AD6C1A77D}"/>
+              </a:ext>
+            </a:extLst>
+          </p:cNvPr>
+          <p:cNvSpPr/>
+          <p:nvPr/>
+        </p:nvSpPr>
+        <p:spPr>
+          <a:xfrm>
+            <a:off x="1496327" y="1981738"/>
+            <a:ext cx="1689848" cy="479074"/>
+          </a:xfrm>
+          <a:prstGeom prst="rect">
+            <a:avLst/>
+          </a:prstGeom>
+          <a:noFill/>
+          <a:ln w="38100">
+            <a:solidFill>
+              <a:schemeClr val="accent2">
+                <a:lumMod val="60000"/>
+                <a:lumOff val="40000"/>
+              </a:schemeClr>
+            </a:solidFill>
+          </a:ln>
+        </p:spPr>
+        <p:style>
+          <a:lnRef idx="2">
+            <a:schemeClr val="accent1">
+              <a:shade val="50000"/>
+            </a:schemeClr>
+          </a:lnRef>
+          <a:fillRef idx="1">
+            <a:schemeClr val="accent1"/>
+          </a:fillRef>
+          <a:effectRef idx="0">
+            <a:schemeClr val="accent1"/>
+          </a:effectRef>
+          <a:fontRef idx="minor">
+            <a:schemeClr val="lt1"/>
+          </a:fontRef>
+        </p:style>
+        <p:txBody>
+          <a:bodyPr rtlCol="0" anchor="ctr"/>
+          <a:lstStyle/>
+          <a:p>
+            <a:pPr algn="ctr"/>
+            <a:r>
+              <a:rPr lang="fr-FR" sz="1000" dirty="0">
+                <a:solidFill>
+                  <a:schemeClr val="accent2">
+                    <a:lumMod val="60000"/>
+                    <a:lumOff val="40000"/>
+                  </a:schemeClr>
+                </a:solidFill>
+                <a:latin typeface="Arial" panose="020B0604020202020204" pitchFamily="34" charset="0"/>
+                <a:cs typeface="Arial" panose="020B0604020202020204" pitchFamily="34" charset="0"/>
+              </a:rPr>
+              <a:t>article / hébergements à Marseille</a:t>
+            </a:r>
+          </a:p>
+        </p:txBody>
+      </p:sp>
+      <p:sp>
+        <p:nvSpPr>
+          <p:cNvPr id="37" name="Rectangle 36">
+            <a:extLst>
+              <a:ext uri="{FF2B5EF4-FFF2-40B4-BE49-F238E27FC236}">
+                <a16:creationId xmlns:a16="http://schemas.microsoft.com/office/drawing/2014/main" id="{26153650-BAA0-4E1F-BADE-0971D385695C}"/>
+              </a:ext>
+            </a:extLst>
+          </p:cNvPr>
+          <p:cNvSpPr/>
+          <p:nvPr/>
+        </p:nvSpPr>
+        <p:spPr>
+          <a:xfrm>
+            <a:off x="1496326" y="2498843"/>
+            <a:ext cx="1689848" cy="479074"/>
+          </a:xfrm>
+          <a:prstGeom prst="rect">
+            <a:avLst/>
+          </a:prstGeom>
+          <a:noFill/>
+          <a:ln w="38100">
+            <a:solidFill>
+              <a:schemeClr val="accent2">
+                <a:lumMod val="60000"/>
+                <a:lumOff val="40000"/>
+              </a:schemeClr>
+            </a:solidFill>
+          </a:ln>
+        </p:spPr>
+        <p:style>
+          <a:lnRef idx="2">
+            <a:schemeClr val="accent1">
+              <a:shade val="50000"/>
+            </a:schemeClr>
+          </a:lnRef>
+          <a:fillRef idx="1">
+            <a:schemeClr val="accent1"/>
+          </a:fillRef>
+          <a:effectRef idx="0">
+            <a:schemeClr val="accent1"/>
+          </a:effectRef>
+          <a:fontRef idx="minor">
+            <a:schemeClr val="lt1"/>
+          </a:fontRef>
+        </p:style>
+        <p:txBody>
+          <a:bodyPr rtlCol="0" anchor="ctr"/>
+          <a:lstStyle/>
+          <a:p>
+            <a:pPr algn="ctr"/>
+            <a:r>
+              <a:rPr lang="fr-FR" sz="1000" dirty="0">
+                <a:solidFill>
+                  <a:schemeClr val="accent2">
+                    <a:lumMod val="60000"/>
+                    <a:lumOff val="40000"/>
+                  </a:schemeClr>
+                </a:solidFill>
+                <a:latin typeface="Arial" panose="020B0604020202020204" pitchFamily="34" charset="0"/>
+                <a:cs typeface="Arial" panose="020B0604020202020204" pitchFamily="34" charset="0"/>
+              </a:rPr>
+              <a:t>les plus populaires</a:t>
+            </a:r>
+          </a:p>
+        </p:txBody>
+      </p:sp>
+      <p:sp>
+        <p:nvSpPr>
+          <p:cNvPr id="38" name="Rectangle 37">
+            <a:extLst>
+              <a:ext uri="{FF2B5EF4-FFF2-40B4-BE49-F238E27FC236}">
+                <a16:creationId xmlns:a16="http://schemas.microsoft.com/office/drawing/2014/main" id="{E11505CA-7707-4832-A79D-EF0BAE45355B}"/>
+              </a:ext>
+            </a:extLst>
+          </p:cNvPr>
+          <p:cNvSpPr/>
+          <p:nvPr/>
+        </p:nvSpPr>
+        <p:spPr>
+          <a:xfrm>
+            <a:off x="1505989" y="3015948"/>
+            <a:ext cx="1689848" cy="479074"/>
+          </a:xfrm>
+          <a:prstGeom prst="rect">
+            <a:avLst/>
+          </a:prstGeom>
+          <a:noFill/>
+          <a:ln w="38100">
+            <a:solidFill>
+              <a:schemeClr val="accent2">
+                <a:lumMod val="60000"/>
+                <a:lumOff val="40000"/>
+              </a:schemeClr>
+            </a:solidFill>
+          </a:ln>
+        </p:spPr>
+        <p:style>
+          <a:lnRef idx="2">
+            <a:schemeClr val="accent1">
+              <a:shade val="50000"/>
+            </a:schemeClr>
+          </a:lnRef>
+          <a:fillRef idx="1">
+            <a:schemeClr val="accent1"/>
+          </a:fillRef>
+          <a:effectRef idx="0">
+            <a:schemeClr val="accent1"/>
+          </a:effectRef>
+          <a:fontRef idx="minor">
+            <a:schemeClr val="lt1"/>
+          </a:fontRef>
+        </p:style>
+        <p:txBody>
+          <a:bodyPr rtlCol="0" anchor="ctr"/>
+          <a:lstStyle/>
+          <a:p>
+            <a:pPr algn="ctr"/>
+            <a:r>
+              <a:rPr lang="fr-FR" sz="1000" dirty="0">
+                <a:solidFill>
+                  <a:schemeClr val="accent2">
+                    <a:lumMod val="60000"/>
+                    <a:lumOff val="40000"/>
+                  </a:schemeClr>
+                </a:solidFill>
+                <a:latin typeface="Arial" panose="020B0604020202020204" pitchFamily="34" charset="0"/>
+                <a:cs typeface="Arial" panose="020B0604020202020204" pitchFamily="34" charset="0"/>
+              </a:rPr>
+              <a:t>activités à Marseille</a:t>
+            </a:r>
+          </a:p>
+        </p:txBody>
+      </p:sp>
+      <p:sp>
+        <p:nvSpPr>
+          <p:cNvPr id="39" name="Rectangle 38">
+            <a:extLst>
+              <a:ext uri="{FF2B5EF4-FFF2-40B4-BE49-F238E27FC236}">
+                <a16:creationId xmlns:a16="http://schemas.microsoft.com/office/drawing/2014/main" id="{F1DAA3FB-35CF-414C-A39C-31B506086E47}"/>
+              </a:ext>
+            </a:extLst>
+          </p:cNvPr>
+          <p:cNvSpPr/>
+          <p:nvPr/>
+        </p:nvSpPr>
+        <p:spPr>
+          <a:xfrm>
+            <a:off x="1462024" y="3635596"/>
+            <a:ext cx="1770725" cy="869167"/>
+          </a:xfrm>
+          <a:prstGeom prst="rect">
+            <a:avLst/>
+          </a:prstGeom>
+          <a:noFill/>
+          <a:ln w="38100">
+            <a:solidFill>
+              <a:schemeClr val="accent6">
+                <a:lumMod val="75000"/>
+              </a:schemeClr>
+            </a:solidFill>
+          </a:ln>
+        </p:spPr>
+        <p:style>
+          <a:lnRef idx="2">
+            <a:schemeClr val="accent1">
+              <a:shade val="50000"/>
+            </a:schemeClr>
+          </a:lnRef>
+          <a:fillRef idx="1">
+            <a:schemeClr val="accent1"/>
+          </a:fillRef>
+          <a:effectRef idx="0">
+            <a:schemeClr val="accent1"/>
+          </a:effectRef>
+          <a:fontRef idx="minor">
+            <a:schemeClr val="lt1"/>
+          </a:fontRef>
+        </p:style>
+        <p:txBody>
+          <a:bodyPr rtlCol="0" anchor="ctr"/>
+          <a:lstStyle/>
+          <a:p>
+            <a:pPr algn="ctr"/>
+            <a:endParaRPr lang="fr-FR" dirty="0">
+              <a:latin typeface="Arial" panose="020B0604020202020204" pitchFamily="34" charset="0"/>
+              <a:cs typeface="Arial" panose="020B0604020202020204" pitchFamily="34" charset="0"/>
+            </a:endParaRPr>
+          </a:p>
+        </p:txBody>
+      </p:sp>
+      <p:sp>
+        <p:nvSpPr>
+          <p:cNvPr id="40" name="Rectangle 39">
+            <a:extLst>
+              <a:ext uri="{FF2B5EF4-FFF2-40B4-BE49-F238E27FC236}">
+                <a16:creationId xmlns:a16="http://schemas.microsoft.com/office/drawing/2014/main" id="{11256D96-2257-4452-9922-44E4FE539F3C}"/>
+              </a:ext>
+            </a:extLst>
+          </p:cNvPr>
+          <p:cNvSpPr/>
+          <p:nvPr/>
+        </p:nvSpPr>
+        <p:spPr>
+          <a:xfrm>
+            <a:off x="1491454" y="3670996"/>
+            <a:ext cx="1699592" cy="239416"/>
+          </a:xfrm>
+          <a:prstGeom prst="rect">
+            <a:avLst/>
+          </a:prstGeom>
+          <a:noFill/>
+          <a:ln w="38100">
+            <a:solidFill>
+              <a:srgbClr val="00B050"/>
+            </a:solidFill>
+          </a:ln>
+        </p:spPr>
+        <p:style>
+          <a:lnRef idx="2">
+            <a:schemeClr val="accent1">
+              <a:shade val="50000"/>
+            </a:schemeClr>
+          </a:lnRef>
+          <a:fillRef idx="1">
+            <a:schemeClr val="accent1"/>
+          </a:fillRef>
+          <a:effectRef idx="0">
+            <a:schemeClr val="accent1"/>
+          </a:effectRef>
+          <a:fontRef idx="minor">
+            <a:schemeClr val="lt1"/>
+          </a:fontRef>
+        </p:style>
+        <p:txBody>
+          <a:bodyPr rtlCol="0" anchor="ctr"/>
+          <a:lstStyle/>
+          <a:p>
+            <a:pPr algn="ctr"/>
+            <a:r>
+              <a:rPr lang="fr-FR" sz="1000" dirty="0">
+                <a:solidFill>
+                  <a:srgbClr val="00B050"/>
+                </a:solidFill>
+                <a:latin typeface="Arial" panose="020B0604020202020204" pitchFamily="34" charset="0"/>
+                <a:cs typeface="Arial" panose="020B0604020202020204" pitchFamily="34" charset="0"/>
+              </a:rPr>
+              <a:t>a propos</a:t>
+            </a:r>
+          </a:p>
+        </p:txBody>
+      </p:sp>
+      <p:sp>
+        <p:nvSpPr>
+          <p:cNvPr id="41" name="Rectangle 40">
+            <a:extLst>
+              <a:ext uri="{FF2B5EF4-FFF2-40B4-BE49-F238E27FC236}">
+                <a16:creationId xmlns:a16="http://schemas.microsoft.com/office/drawing/2014/main" id="{333B00CF-98D4-4902-8CDE-2FE2B1539E07}"/>
+              </a:ext>
+            </a:extLst>
+          </p:cNvPr>
+          <p:cNvSpPr/>
+          <p:nvPr/>
+        </p:nvSpPr>
+        <p:spPr>
+          <a:xfrm>
+            <a:off x="1491454" y="3950704"/>
+            <a:ext cx="1699592" cy="239416"/>
+          </a:xfrm>
+          <a:prstGeom prst="rect">
+            <a:avLst/>
+          </a:prstGeom>
+          <a:noFill/>
+          <a:ln w="38100">
+            <a:solidFill>
+              <a:srgbClr val="00B050"/>
+            </a:solidFill>
+          </a:ln>
+        </p:spPr>
+        <p:style>
+          <a:lnRef idx="2">
+            <a:schemeClr val="accent1">
+              <a:shade val="50000"/>
+            </a:schemeClr>
+          </a:lnRef>
+          <a:fillRef idx="1">
+            <a:schemeClr val="accent1"/>
+          </a:fillRef>
+          <a:effectRef idx="0">
+            <a:schemeClr val="accent1"/>
+          </a:effectRef>
+          <a:fontRef idx="minor">
+            <a:schemeClr val="lt1"/>
+          </a:fontRef>
+        </p:style>
+        <p:txBody>
+          <a:bodyPr rtlCol="0" anchor="ctr"/>
+          <a:lstStyle/>
+          <a:p>
+            <a:pPr algn="ctr"/>
+            <a:r>
+              <a:rPr lang="fr-FR" sz="1000" dirty="0">
+                <a:solidFill>
+                  <a:srgbClr val="00B050"/>
+                </a:solidFill>
+                <a:latin typeface="Arial" panose="020B0604020202020204" pitchFamily="34" charset="0"/>
+                <a:cs typeface="Arial" panose="020B0604020202020204" pitchFamily="34" charset="0"/>
+              </a:rPr>
+              <a:t>nos hébergements</a:t>
+            </a:r>
+          </a:p>
+        </p:txBody>
+      </p:sp>
+      <p:sp>
+        <p:nvSpPr>
+          <p:cNvPr id="42" name="Rectangle 41">
+            <a:extLst>
+              <a:ext uri="{FF2B5EF4-FFF2-40B4-BE49-F238E27FC236}">
+                <a16:creationId xmlns:a16="http://schemas.microsoft.com/office/drawing/2014/main" id="{881EB091-9DF1-4213-BC44-4953E21FE162}"/>
+              </a:ext>
+            </a:extLst>
+          </p:cNvPr>
+          <p:cNvSpPr/>
+          <p:nvPr/>
+        </p:nvSpPr>
+        <p:spPr>
+          <a:xfrm>
+            <a:off x="1496245" y="4226388"/>
+            <a:ext cx="1699592" cy="239416"/>
+          </a:xfrm>
+          <a:prstGeom prst="rect">
+            <a:avLst/>
+          </a:prstGeom>
+          <a:noFill/>
+          <a:ln w="38100">
+            <a:solidFill>
+              <a:srgbClr val="00B050"/>
+            </a:solidFill>
+          </a:ln>
+        </p:spPr>
+        <p:style>
+          <a:lnRef idx="2">
+            <a:schemeClr val="accent1">
+              <a:shade val="50000"/>
+            </a:schemeClr>
+          </a:lnRef>
+          <a:fillRef idx="1">
+            <a:schemeClr val="accent1"/>
+          </a:fillRef>
+          <a:effectRef idx="0">
+            <a:schemeClr val="accent1"/>
+          </a:effectRef>
+          <a:fontRef idx="minor">
+            <a:schemeClr val="lt1"/>
+          </a:fontRef>
+        </p:style>
+        <p:txBody>
+          <a:bodyPr rtlCol="0" anchor="ctr"/>
+          <a:lstStyle/>
+          <a:p>
+            <a:pPr algn="ctr"/>
+            <a:r>
+              <a:rPr lang="fr-FR" sz="1000" dirty="0">
+                <a:solidFill>
+                  <a:srgbClr val="00B050"/>
+                </a:solidFill>
+                <a:latin typeface="Arial" panose="020B0604020202020204" pitchFamily="34" charset="0"/>
+                <a:cs typeface="Arial" panose="020B0604020202020204" pitchFamily="34" charset="0"/>
+              </a:rPr>
+              <a:t>assistance</a:t>
             </a:r>
           </a:p>
         </p:txBody>

</xml_diff>

<commit_message>
Remplacer px par % comme mesure.
</commit_message>
<xml_diff>
--- a/web design.pptx
+++ b/web design.pptx
@@ -261,7 +261,7 @@
           <a:p>
             <a:fld id="{767FAD24-E2EA-4E28-A795-C73D898D3785}" type="datetimeFigureOut">
               <a:rPr lang="fr-FR" smtClean="0"/>
-              <a:t>23/03/2021</a:t>
+              <a:t>25/03/2021</a:t>
             </a:fld>
             <a:endParaRPr lang="fr-FR"/>
           </a:p>
@@ -459,7 +459,7 @@
           <a:p>
             <a:fld id="{767FAD24-E2EA-4E28-A795-C73D898D3785}" type="datetimeFigureOut">
               <a:rPr lang="fr-FR" smtClean="0"/>
-              <a:t>23/03/2021</a:t>
+              <a:t>25/03/2021</a:t>
             </a:fld>
             <a:endParaRPr lang="fr-FR"/>
           </a:p>
@@ -667,7 +667,7 @@
           <a:p>
             <a:fld id="{767FAD24-E2EA-4E28-A795-C73D898D3785}" type="datetimeFigureOut">
               <a:rPr lang="fr-FR" smtClean="0"/>
-              <a:t>23/03/2021</a:t>
+              <a:t>25/03/2021</a:t>
             </a:fld>
             <a:endParaRPr lang="fr-FR"/>
           </a:p>
@@ -865,7 +865,7 @@
           <a:p>
             <a:fld id="{767FAD24-E2EA-4E28-A795-C73D898D3785}" type="datetimeFigureOut">
               <a:rPr lang="fr-FR" smtClean="0"/>
-              <a:t>23/03/2021</a:t>
+              <a:t>25/03/2021</a:t>
             </a:fld>
             <a:endParaRPr lang="fr-FR"/>
           </a:p>
@@ -1140,7 +1140,7 @@
           <a:p>
             <a:fld id="{767FAD24-E2EA-4E28-A795-C73D898D3785}" type="datetimeFigureOut">
               <a:rPr lang="fr-FR" smtClean="0"/>
-              <a:t>23/03/2021</a:t>
+              <a:t>25/03/2021</a:t>
             </a:fld>
             <a:endParaRPr lang="fr-FR"/>
           </a:p>
@@ -1405,7 +1405,7 @@
           <a:p>
             <a:fld id="{767FAD24-E2EA-4E28-A795-C73D898D3785}" type="datetimeFigureOut">
               <a:rPr lang="fr-FR" smtClean="0"/>
-              <a:t>23/03/2021</a:t>
+              <a:t>25/03/2021</a:t>
             </a:fld>
             <a:endParaRPr lang="fr-FR"/>
           </a:p>
@@ -1817,7 +1817,7 @@
           <a:p>
             <a:fld id="{767FAD24-E2EA-4E28-A795-C73D898D3785}" type="datetimeFigureOut">
               <a:rPr lang="fr-FR" smtClean="0"/>
-              <a:t>23/03/2021</a:t>
+              <a:t>25/03/2021</a:t>
             </a:fld>
             <a:endParaRPr lang="fr-FR"/>
           </a:p>
@@ -1958,7 +1958,7 @@
           <a:p>
             <a:fld id="{767FAD24-E2EA-4E28-A795-C73D898D3785}" type="datetimeFigureOut">
               <a:rPr lang="fr-FR" smtClean="0"/>
-              <a:t>23/03/2021</a:t>
+              <a:t>25/03/2021</a:t>
             </a:fld>
             <a:endParaRPr lang="fr-FR"/>
           </a:p>
@@ -2071,7 +2071,7 @@
           <a:p>
             <a:fld id="{767FAD24-E2EA-4E28-A795-C73D898D3785}" type="datetimeFigureOut">
               <a:rPr lang="fr-FR" smtClean="0"/>
-              <a:t>23/03/2021</a:t>
+              <a:t>25/03/2021</a:t>
             </a:fld>
             <a:endParaRPr lang="fr-FR"/>
           </a:p>
@@ -2382,7 +2382,7 @@
           <a:p>
             <a:fld id="{767FAD24-E2EA-4E28-A795-C73D898D3785}" type="datetimeFigureOut">
               <a:rPr lang="fr-FR" smtClean="0"/>
-              <a:t>23/03/2021</a:t>
+              <a:t>25/03/2021</a:t>
             </a:fld>
             <a:endParaRPr lang="fr-FR"/>
           </a:p>
@@ -2670,7 +2670,7 @@
           <a:p>
             <a:fld id="{767FAD24-E2EA-4E28-A795-C73D898D3785}" type="datetimeFigureOut">
               <a:rPr lang="fr-FR" smtClean="0"/>
-              <a:t>23/03/2021</a:t>
+              <a:t>25/03/2021</a:t>
             </a:fld>
             <a:endParaRPr lang="fr-FR"/>
           </a:p>
@@ -2911,7 +2911,7 @@
           <a:p>
             <a:fld id="{767FAD24-E2EA-4E28-A795-C73D898D3785}" type="datetimeFigureOut">
               <a:rPr lang="fr-FR" smtClean="0"/>
-              <a:t>23/03/2021</a:t>
+              <a:t>25/03/2021</a:t>
             </a:fld>
             <a:endParaRPr lang="fr-FR"/>
           </a:p>

</xml_diff>

<commit_message>
Css pour Iphone correct
</commit_message>
<xml_diff>
--- a/web design.pptx
+++ b/web design.pptx
@@ -261,7 +261,7 @@
           <a:p>
             <a:fld id="{767FAD24-E2EA-4E28-A795-C73D898D3785}" type="datetimeFigureOut">
               <a:rPr lang="fr-FR" smtClean="0"/>
-              <a:t>04/04/2021</a:t>
+              <a:t>16/04/2021</a:t>
             </a:fld>
             <a:endParaRPr lang="fr-FR"/>
           </a:p>
@@ -459,7 +459,7 @@
           <a:p>
             <a:fld id="{767FAD24-E2EA-4E28-A795-C73D898D3785}" type="datetimeFigureOut">
               <a:rPr lang="fr-FR" smtClean="0"/>
-              <a:t>04/04/2021</a:t>
+              <a:t>16/04/2021</a:t>
             </a:fld>
             <a:endParaRPr lang="fr-FR"/>
           </a:p>
@@ -667,7 +667,7 @@
           <a:p>
             <a:fld id="{767FAD24-E2EA-4E28-A795-C73D898D3785}" type="datetimeFigureOut">
               <a:rPr lang="fr-FR" smtClean="0"/>
-              <a:t>04/04/2021</a:t>
+              <a:t>16/04/2021</a:t>
             </a:fld>
             <a:endParaRPr lang="fr-FR"/>
           </a:p>
@@ -865,7 +865,7 @@
           <a:p>
             <a:fld id="{767FAD24-E2EA-4E28-A795-C73D898D3785}" type="datetimeFigureOut">
               <a:rPr lang="fr-FR" smtClean="0"/>
-              <a:t>04/04/2021</a:t>
+              <a:t>16/04/2021</a:t>
             </a:fld>
             <a:endParaRPr lang="fr-FR"/>
           </a:p>
@@ -1140,7 +1140,7 @@
           <a:p>
             <a:fld id="{767FAD24-E2EA-4E28-A795-C73D898D3785}" type="datetimeFigureOut">
               <a:rPr lang="fr-FR" smtClean="0"/>
-              <a:t>04/04/2021</a:t>
+              <a:t>16/04/2021</a:t>
             </a:fld>
             <a:endParaRPr lang="fr-FR"/>
           </a:p>
@@ -1405,7 +1405,7 @@
           <a:p>
             <a:fld id="{767FAD24-E2EA-4E28-A795-C73D898D3785}" type="datetimeFigureOut">
               <a:rPr lang="fr-FR" smtClean="0"/>
-              <a:t>04/04/2021</a:t>
+              <a:t>16/04/2021</a:t>
             </a:fld>
             <a:endParaRPr lang="fr-FR"/>
           </a:p>
@@ -1817,7 +1817,7 @@
           <a:p>
             <a:fld id="{767FAD24-E2EA-4E28-A795-C73D898D3785}" type="datetimeFigureOut">
               <a:rPr lang="fr-FR" smtClean="0"/>
-              <a:t>04/04/2021</a:t>
+              <a:t>16/04/2021</a:t>
             </a:fld>
             <a:endParaRPr lang="fr-FR"/>
           </a:p>
@@ -1958,7 +1958,7 @@
           <a:p>
             <a:fld id="{767FAD24-E2EA-4E28-A795-C73D898D3785}" type="datetimeFigureOut">
               <a:rPr lang="fr-FR" smtClean="0"/>
-              <a:t>04/04/2021</a:t>
+              <a:t>16/04/2021</a:t>
             </a:fld>
             <a:endParaRPr lang="fr-FR"/>
           </a:p>
@@ -2071,7 +2071,7 @@
           <a:p>
             <a:fld id="{767FAD24-E2EA-4E28-A795-C73D898D3785}" type="datetimeFigureOut">
               <a:rPr lang="fr-FR" smtClean="0"/>
-              <a:t>04/04/2021</a:t>
+              <a:t>16/04/2021</a:t>
             </a:fld>
             <a:endParaRPr lang="fr-FR"/>
           </a:p>
@@ -2382,7 +2382,7 @@
           <a:p>
             <a:fld id="{767FAD24-E2EA-4E28-A795-C73D898D3785}" type="datetimeFigureOut">
               <a:rPr lang="fr-FR" smtClean="0"/>
-              <a:t>04/04/2021</a:t>
+              <a:t>16/04/2021</a:t>
             </a:fld>
             <a:endParaRPr lang="fr-FR"/>
           </a:p>
@@ -2670,7 +2670,7 @@
           <a:p>
             <a:fld id="{767FAD24-E2EA-4E28-A795-C73D898D3785}" type="datetimeFigureOut">
               <a:rPr lang="fr-FR" smtClean="0"/>
-              <a:t>04/04/2021</a:t>
+              <a:t>16/04/2021</a:t>
             </a:fld>
             <a:endParaRPr lang="fr-FR"/>
           </a:p>
@@ -2911,7 +2911,7 @@
           <a:p>
             <a:fld id="{767FAD24-E2EA-4E28-A795-C73D898D3785}" type="datetimeFigureOut">
               <a:rPr lang="fr-FR" smtClean="0"/>
-              <a:t>04/04/2021</a:t>
+              <a:t>16/04/2021</a:t>
             </a:fld>
             <a:endParaRPr lang="fr-FR"/>
           </a:p>
@@ -3460,7 +3460,7 @@
         </p:blipFill>
         <p:spPr>
           <a:xfrm>
-            <a:off x="2012874" y="1306880"/>
+            <a:off x="1678919" y="334925"/>
             <a:ext cx="4879144" cy="6383547"/>
           </a:xfrm>
           <a:prstGeom prst="rect">

</xml_diff>